<commit_message>
Adding all to git befor format computer
</commit_message>
<xml_diff>
--- a/documents/POS World-Project Brief.pptx
+++ b/documents/POS World-Project Brief.pptx
@@ -15,7 +15,6 @@
     <p:sldId id="263" r:id="rId9"/>
     <p:sldId id="264" r:id="rId10"/>
     <p:sldId id="266" r:id="rId11"/>
-    <p:sldId id="270" r:id="rId12"/>
   </p:sldIdLst>
   <p:sldSz cx="12192000" cy="6858000"/>
   <p:notesSz cx="6858000" cy="9144000"/>
@@ -314,7 +313,7 @@
             <a:fld id="{B61BEF0D-F0BB-DE4B-95CE-6DB70DBA9567}" type="datetimeFigureOut">
               <a:rPr lang="en-US" dirty="0"/>
               <a:pPr/>
-              <a:t>7/27/2019</a:t>
+              <a:t>8/3/2019</a:t>
             </a:fld>
             <a:endParaRPr lang="en-US" dirty="0"/>
           </a:p>
@@ -666,10 +665,9 @@
           </a:lstStyle>
           <a:p>
             <a:r>
-              <a:rPr lang="en-US"/>
+              <a:rPr lang="en-US" dirty="0"/>
               <a:t>Click icon to add picture</a:t>
             </a:r>
-            <a:endParaRPr lang="en-US" dirty="0"/>
           </a:p>
         </p:txBody>
       </p:sp>
@@ -747,7 +745,7 @@
             <a:fld id="{B61BEF0D-F0BB-DE4B-95CE-6DB70DBA9567}" type="datetimeFigureOut">
               <a:rPr lang="en-US" dirty="0"/>
               <a:pPr/>
-              <a:t>7/27/2019</a:t>
+              <a:t>8/3/2019</a:t>
             </a:fld>
             <a:endParaRPr lang="en-US" dirty="0"/>
           </a:p>
@@ -994,7 +992,7 @@
             <a:fld id="{B61BEF0D-F0BB-DE4B-95CE-6DB70DBA9567}" type="datetimeFigureOut">
               <a:rPr lang="en-US" dirty="0"/>
               <a:pPr/>
-              <a:t>7/27/2019</a:t>
+              <a:t>8/3/2019</a:t>
             </a:fld>
             <a:endParaRPr lang="en-US" dirty="0"/>
           </a:p>
@@ -1299,7 +1297,7 @@
             <a:fld id="{B61BEF0D-F0BB-DE4B-95CE-6DB70DBA9567}" type="datetimeFigureOut">
               <a:rPr lang="en-US" dirty="0"/>
               <a:pPr/>
-              <a:t>7/27/2019</a:t>
+              <a:t>8/3/2019</a:t>
             </a:fld>
             <a:endParaRPr lang="en-US" dirty="0"/>
           </a:p>
@@ -1614,7 +1612,7 @@
             <a:fld id="{B61BEF0D-F0BB-DE4B-95CE-6DB70DBA9567}" type="datetimeFigureOut">
               <a:rPr lang="en-US" dirty="0"/>
               <a:pPr/>
-              <a:t>7/27/2019</a:t>
+              <a:t>8/3/2019</a:t>
             </a:fld>
             <a:endParaRPr lang="en-US" dirty="0"/>
           </a:p>
@@ -1913,7 +1911,7 @@
             <a:fld id="{B61BEF0D-F0BB-DE4B-95CE-6DB70DBA9567}" type="datetimeFigureOut">
               <a:rPr lang="en-US" dirty="0"/>
               <a:pPr/>
-              <a:t>7/27/2019</a:t>
+              <a:t>8/3/2019</a:t>
             </a:fld>
             <a:endParaRPr lang="en-US" dirty="0"/>
           </a:p>
@@ -2277,7 +2275,7 @@
             <a:fld id="{B61BEF0D-F0BB-DE4B-95CE-6DB70DBA9567}" type="datetimeFigureOut">
               <a:rPr lang="en-US" dirty="0"/>
               <a:pPr/>
-              <a:t>7/27/2019</a:t>
+              <a:t>8/3/2019</a:t>
             </a:fld>
             <a:endParaRPr lang="en-US" dirty="0"/>
           </a:p>
@@ -2448,7 +2446,7 @@
             <a:fld id="{B61BEF0D-F0BB-DE4B-95CE-6DB70DBA9567}" type="datetimeFigureOut">
               <a:rPr lang="en-US" dirty="0"/>
               <a:pPr/>
-              <a:t>7/27/2019</a:t>
+              <a:t>8/3/2019</a:t>
             </a:fld>
             <a:endParaRPr lang="en-US" dirty="0"/>
           </a:p>
@@ -2625,7 +2623,7 @@
             <a:fld id="{B61BEF0D-F0BB-DE4B-95CE-6DB70DBA9567}" type="datetimeFigureOut">
               <a:rPr lang="en-US" dirty="0"/>
               <a:pPr/>
-              <a:t>7/27/2019</a:t>
+              <a:t>8/3/2019</a:t>
             </a:fld>
             <a:endParaRPr lang="en-US" dirty="0"/>
           </a:p>
@@ -2792,7 +2790,7 @@
             <a:fld id="{B61BEF0D-F0BB-DE4B-95CE-6DB70DBA9567}" type="datetimeFigureOut">
               <a:rPr lang="en-US" dirty="0"/>
               <a:pPr/>
-              <a:t>7/27/2019</a:t>
+              <a:t>8/3/2019</a:t>
             </a:fld>
             <a:endParaRPr lang="en-US" dirty="0"/>
           </a:p>
@@ -3039,7 +3037,7 @@
             <a:fld id="{B61BEF0D-F0BB-DE4B-95CE-6DB70DBA9567}" type="datetimeFigureOut">
               <a:rPr lang="en-US" dirty="0"/>
               <a:pPr/>
-              <a:t>7/27/2019</a:t>
+              <a:t>8/3/2019</a:t>
             </a:fld>
             <a:endParaRPr lang="en-US" dirty="0"/>
           </a:p>
@@ -3272,7 +3270,7 @@
             <a:fld id="{B61BEF0D-F0BB-DE4B-95CE-6DB70DBA9567}" type="datetimeFigureOut">
               <a:rPr lang="en-US" dirty="0"/>
               <a:pPr/>
-              <a:t>7/27/2019</a:t>
+              <a:t>8/3/2019</a:t>
             </a:fld>
             <a:endParaRPr lang="en-US" dirty="0"/>
           </a:p>
@@ -3651,7 +3649,7 @@
             <a:fld id="{B61BEF0D-F0BB-DE4B-95CE-6DB70DBA9567}" type="datetimeFigureOut">
               <a:rPr lang="en-US" dirty="0"/>
               <a:pPr/>
-              <a:t>7/27/2019</a:t>
+              <a:t>8/3/2019</a:t>
             </a:fld>
             <a:endParaRPr lang="en-US" dirty="0"/>
           </a:p>
@@ -3766,7 +3764,7 @@
             <a:fld id="{B61BEF0D-F0BB-DE4B-95CE-6DB70DBA9567}" type="datetimeFigureOut">
               <a:rPr lang="en-US" dirty="0"/>
               <a:pPr/>
-              <a:t>7/27/2019</a:t>
+              <a:t>8/3/2019</a:t>
             </a:fld>
             <a:endParaRPr lang="en-US" dirty="0"/>
           </a:p>
@@ -3858,7 +3856,7 @@
             <a:fld id="{B61BEF0D-F0BB-DE4B-95CE-6DB70DBA9567}" type="datetimeFigureOut">
               <a:rPr lang="en-US" dirty="0"/>
               <a:pPr/>
-              <a:t>7/27/2019</a:t>
+              <a:t>8/3/2019</a:t>
             </a:fld>
             <a:endParaRPr lang="en-US" dirty="0"/>
           </a:p>
@@ -4110,7 +4108,7 @@
             <a:fld id="{B61BEF0D-F0BB-DE4B-95CE-6DB70DBA9567}" type="datetimeFigureOut">
               <a:rPr lang="en-US" dirty="0"/>
               <a:pPr/>
-              <a:t>7/27/2019</a:t>
+              <a:t>8/3/2019</a:t>
             </a:fld>
             <a:endParaRPr lang="en-US" dirty="0"/>
           </a:p>
@@ -4298,10 +4296,9 @@
           </a:lstStyle>
           <a:p>
             <a:r>
-              <a:rPr lang="en-US"/>
+              <a:rPr lang="en-US" dirty="0"/>
               <a:t>Click icon to add picture</a:t>
             </a:r>
-            <a:endParaRPr lang="en-US" dirty="0"/>
           </a:p>
         </p:txBody>
       </p:sp>
@@ -4390,7 +4387,7 @@
             <a:fld id="{B61BEF0D-F0BB-DE4B-95CE-6DB70DBA9567}" type="datetimeFigureOut">
               <a:rPr lang="en-US" dirty="0"/>
               <a:pPr/>
-              <a:t>7/27/2019</a:t>
+              <a:t>8/3/2019</a:t>
             </a:fld>
             <a:endParaRPr lang="en-US" dirty="0"/>
           </a:p>
@@ -4793,7 +4790,7 @@
             <a:fld id="{B61BEF0D-F0BB-DE4B-95CE-6DB70DBA9567}" type="datetimeFigureOut">
               <a:rPr lang="en-US" dirty="0"/>
               <a:pPr/>
-              <a:t>7/27/2019</a:t>
+              <a:t>8/3/2019</a:t>
             </a:fld>
             <a:endParaRPr lang="en-US" dirty="0"/>
           </a:p>
@@ -5725,7 +5722,7 @@
           <a:lstStyle/>
           <a:p>
             <a:pPr algn="ctr"/>
-            <a:endParaRPr lang="en-US"/>
+            <a:endParaRPr lang="en-US" dirty="0"/>
           </a:p>
         </p:txBody>
       </p:sp>
@@ -5733,222 +5730,6 @@
     <p:extLst>
       <p:ext uri="{BB962C8B-B14F-4D97-AF65-F5344CB8AC3E}">
         <p14:creationId xmlns:p14="http://schemas.microsoft.com/office/powerpoint/2010/main" val="2872154567"/>
-      </p:ext>
-    </p:extLst>
-  </p:cSld>
-  <p:clrMapOvr>
-    <a:masterClrMapping/>
-  </p:clrMapOvr>
-</p:sld>
-</file>
-
-<file path=ppt/slides/slide11.xml><?xml version="1.0" encoding="utf-8"?>
-<p:sld xmlns:a="http://schemas.openxmlformats.org/drawingml/2006/main" xmlns:r="http://schemas.openxmlformats.org/officeDocument/2006/relationships" xmlns:p="http://schemas.openxmlformats.org/presentationml/2006/main">
-  <p:cSld>
-    <p:spTree>
-      <p:nvGrpSpPr>
-        <p:cNvPr id="1" name=""/>
-        <p:cNvGrpSpPr/>
-        <p:nvPr/>
-      </p:nvGrpSpPr>
-      <p:grpSpPr>
-        <a:xfrm>
-          <a:off x="0" y="0"/>
-          <a:ext cx="0" cy="0"/>
-          <a:chOff x="0" y="0"/>
-          <a:chExt cx="0" cy="0"/>
-        </a:xfrm>
-      </p:grpSpPr>
-      <p:sp>
-        <p:nvSpPr>
-          <p:cNvPr id="2" name="Rectangle 1"/>
-          <p:cNvSpPr/>
-          <p:nvPr/>
-        </p:nvSpPr>
-        <p:spPr>
-          <a:xfrm>
-            <a:off x="1005839" y="339635"/>
-            <a:ext cx="9888584" cy="5355312"/>
-          </a:xfrm>
-          <a:prstGeom prst="rect">
-            <a:avLst/>
-          </a:prstGeom>
-        </p:spPr>
-        <p:txBody>
-          <a:bodyPr wrap="square">
-            <a:spAutoFit/>
-          </a:bodyPr>
-          <a:lstStyle/>
-          <a:p>
-            <a:pPr marR="0" lvl="0">
-              <a:lnSpc>
-                <a:spcPct val="150000"/>
-              </a:lnSpc>
-              <a:spcBef>
-                <a:spcPts val="2400"/>
-              </a:spcBef>
-              <a:spcAft>
-                <a:spcPts val="600"/>
-              </a:spcAft>
-            </a:pPr>
-            <a:r>
-              <a:rPr lang="en-US" sz="3200" b="1" kern="0" dirty="0">
-                <a:solidFill>
-                  <a:schemeClr val="bg1"/>
-                </a:solidFill>
-                <a:latin typeface="Times New Roman" panose="02020603050405020304" pitchFamily="18" charset="0"/>
-              </a:rPr>
-              <a:t>REFERENCES……</a:t>
-            </a:r>
-          </a:p>
-          <a:p>
-            <a:pPr marR="0" lvl="0">
-              <a:lnSpc>
-                <a:spcPct val="150000"/>
-              </a:lnSpc>
-              <a:spcBef>
-                <a:spcPts val="2400"/>
-              </a:spcBef>
-              <a:spcAft>
-                <a:spcPts val="600"/>
-              </a:spcAft>
-            </a:pPr>
-            <a:endParaRPr lang="en-US" sz="1600" b="1" kern="0" dirty="0">
-              <a:solidFill>
-                <a:schemeClr val="bg1"/>
-              </a:solidFill>
-              <a:latin typeface="Calibri" panose="020F0502020204030204" pitchFamily="34" charset="0"/>
-            </a:endParaRPr>
-          </a:p>
-          <a:p>
-            <a:pPr marL="342900" marR="0" lvl="0" indent="-342900">
-              <a:lnSpc>
-                <a:spcPct val="150000"/>
-              </a:lnSpc>
-              <a:spcBef>
-                <a:spcPts val="0"/>
-              </a:spcBef>
-              <a:spcAft>
-                <a:spcPts val="0"/>
-              </a:spcAft>
-              <a:buFont typeface="Symbol" panose="05050102010706020507" pitchFamily="18" charset="2"/>
-              <a:buChar char=""/>
-            </a:pPr>
-            <a:r>
-              <a:rPr lang="en-US" sz="2800" b="1" dirty="0">
-                <a:solidFill>
-                  <a:schemeClr val="bg1"/>
-                </a:solidFill>
-                <a:latin typeface="Times New Roman" panose="02020603050405020304" pitchFamily="18" charset="0"/>
-                <a:ea typeface="Calibri" panose="020F0502020204030204" pitchFamily="34" charset="0"/>
-              </a:rPr>
-              <a:t>A great thanks to the creator and the buddies that supports Java platform and maintaining as a powerful simple software.</a:t>
-            </a:r>
-          </a:p>
-          <a:p>
-            <a:pPr marR="0" lvl="0">
-              <a:lnSpc>
-                <a:spcPct val="150000"/>
-              </a:lnSpc>
-              <a:spcBef>
-                <a:spcPts val="0"/>
-              </a:spcBef>
-              <a:spcAft>
-                <a:spcPts val="0"/>
-              </a:spcAft>
-            </a:pPr>
-            <a:endParaRPr lang="en-US" sz="2000" b="1" dirty="0">
-              <a:solidFill>
-                <a:schemeClr val="bg1"/>
-              </a:solidFill>
-              <a:latin typeface="Calibri" panose="020F0502020204030204" pitchFamily="34" charset="0"/>
-              <a:ea typeface="Calibri" panose="020F0502020204030204" pitchFamily="34" charset="0"/>
-            </a:endParaRPr>
-          </a:p>
-          <a:p>
-            <a:pPr marL="342900" marR="0" lvl="0" indent="-342900">
-              <a:lnSpc>
-                <a:spcPct val="150000"/>
-              </a:lnSpc>
-              <a:spcBef>
-                <a:spcPts val="0"/>
-              </a:spcBef>
-              <a:spcAft>
-                <a:spcPts val="800"/>
-              </a:spcAft>
-              <a:buFont typeface="Symbol" panose="05050102010706020507" pitchFamily="18" charset="2"/>
-              <a:buChar char=""/>
-            </a:pPr>
-            <a:r>
-              <a:rPr lang="en-US" sz="2800" b="1" dirty="0">
-                <a:solidFill>
-                  <a:schemeClr val="bg1"/>
-                </a:solidFill>
-                <a:latin typeface="Times New Roman" panose="02020603050405020304" pitchFamily="18" charset="0"/>
-                <a:ea typeface="Calibri" panose="020F0502020204030204" pitchFamily="34" charset="0"/>
-              </a:rPr>
-              <a:t>Cannot forget MySQL team to create a powerful but simple database tool and providing the users as nonprofit basis.</a:t>
-            </a:r>
-            <a:endParaRPr lang="en-US" sz="2400" b="1" dirty="0">
-              <a:solidFill>
-                <a:schemeClr val="bg1"/>
-              </a:solidFill>
-              <a:effectLst/>
-              <a:latin typeface="Calibri" panose="020F0502020204030204" pitchFamily="34" charset="0"/>
-              <a:ea typeface="Calibri" panose="020F0502020204030204" pitchFamily="34" charset="0"/>
-            </a:endParaRPr>
-          </a:p>
-        </p:txBody>
-      </p:sp>
-      <p:sp>
-        <p:nvSpPr>
-          <p:cNvPr id="3" name="Left Arrow 2">
-            <a:hlinkClick r:id="rId2" action="ppaction://hlinksldjump"/>
-          </p:cNvPr>
-          <p:cNvSpPr/>
-          <p:nvPr/>
-        </p:nvSpPr>
-        <p:spPr>
-          <a:xfrm>
-            <a:off x="1410789" y="5904411"/>
-            <a:ext cx="1776548" cy="640080"/>
-          </a:xfrm>
-          <a:prstGeom prst="leftArrow">
-            <a:avLst/>
-          </a:prstGeom>
-          <a:solidFill>
-            <a:srgbClr val="FFFF00"/>
-          </a:solidFill>
-        </p:spPr>
-        <p:style>
-          <a:lnRef idx="2">
-            <a:schemeClr val="accent1">
-              <a:shade val="50000"/>
-            </a:schemeClr>
-          </a:lnRef>
-          <a:fillRef idx="1">
-            <a:schemeClr val="accent1"/>
-          </a:fillRef>
-          <a:effectRef idx="0">
-            <a:schemeClr val="accent1"/>
-          </a:effectRef>
-          <a:fontRef idx="minor">
-            <a:schemeClr val="lt1"/>
-          </a:fontRef>
-        </p:style>
-        <p:txBody>
-          <a:bodyPr rtlCol="0" anchor="ctr"/>
-          <a:lstStyle/>
-          <a:p>
-            <a:pPr algn="ctr"/>
-            <a:endParaRPr lang="en-US"/>
-          </a:p>
-        </p:txBody>
-      </p:sp>
-    </p:spTree>
-    <p:extLst>
-      <p:ext uri="{BB962C8B-B14F-4D97-AF65-F5344CB8AC3E}">
-        <p14:creationId xmlns:p14="http://schemas.microsoft.com/office/powerpoint/2010/main" val="650921500"/>
       </p:ext>
     </p:extLst>
   </p:cSld>
@@ -6105,7 +5886,7 @@
                         </a:spcAft>
                       </a:pPr>
                       <a:r>
-                        <a:rPr lang="en-US" sz="3200" b="1">
+                        <a:rPr lang="en-US" sz="3200" b="1" dirty="0">
                           <a:solidFill>
                             <a:schemeClr val="bg1"/>
                           </a:solidFill>
@@ -6115,7 +5896,7 @@
                         </a:rPr>
                         <a:t>Group Name:</a:t>
                       </a:r>
-                      <a:endParaRPr lang="en-US" sz="3200" b="1">
+                      <a:endParaRPr lang="en-US" sz="3200" b="1" dirty="0">
                         <a:solidFill>
                           <a:schemeClr val="bg1"/>
                         </a:solidFill>
@@ -6512,7 +6293,7 @@
                         </a:spcAft>
                       </a:pPr>
                       <a:r>
-                        <a:rPr lang="en-US" sz="1600" b="1">
+                        <a:rPr lang="en-US" sz="1600" b="1" dirty="0">
                           <a:solidFill>
                             <a:schemeClr val="bg1"/>
                           </a:solidFill>
@@ -6522,7 +6303,7 @@
                         </a:rPr>
                         <a:t>Sheshan Aturupana</a:t>
                       </a:r>
-                      <a:endParaRPr lang="en-US" sz="1600" b="1">
+                      <a:endParaRPr lang="en-US" sz="1600" b="1" dirty="0">
                         <a:solidFill>
                           <a:schemeClr val="bg1"/>
                         </a:solidFill>
@@ -7298,8 +7079,8 @@
         </p:nvSpPr>
         <p:spPr bwMode="auto">
           <a:xfrm>
-            <a:off x="2339788" y="1380857"/>
-            <a:ext cx="8955741" cy="5078313"/>
+            <a:off x="2339788" y="1657856"/>
+            <a:ext cx="8955741" cy="4524315"/>
           </a:xfrm>
           <a:prstGeom prst="rect">
             <a:avLst/>
@@ -7530,13 +7311,19 @@
                   <a:noFill/>
                 </a:ln>
                 <a:solidFill>
-                  <a:schemeClr val="tx1"/>
+                  <a:schemeClr val="bg1"/>
                 </a:solidFill>
                 <a:effectLst/>
                 <a:latin typeface="Times New Roman" panose="02020603050405020304" pitchFamily="18" charset="0"/>
                 <a:ea typeface="Calibri" panose="020F0502020204030204" pitchFamily="34" charset="0"/>
                 <a:cs typeface="Times New Roman" panose="02020603050405020304" pitchFamily="18" charset="0"/>
-                <a:hlinkClick r:id="rId2" action="ppaction://hlinksldjump"/>
+                <a:hlinkClick r:id="rId2" action="ppaction://hlinksldjump">
+                  <a:extLst>
+                    <a:ext uri="{A12FA001-AC4F-418D-AE19-62706E023703}">
+                      <ahyp:hlinkClr xmlns:ahyp="http://schemas.microsoft.com/office/drawing/2018/hyperlinkcolor" val="tx"/>
+                    </a:ext>
+                  </a:extLst>
+                </a:hlinkClick>
               </a:rPr>
               <a:t>What Is POS World?</a:t>
             </a:r>
@@ -7545,7 +7332,7 @@
                 <a:noFill/>
               </a:ln>
               <a:solidFill>
-                <a:schemeClr val="tx1"/>
+                <a:schemeClr val="bg1"/>
               </a:solidFill>
               <a:effectLst/>
               <a:latin typeface="Times New Roman" panose="02020603050405020304" pitchFamily="18" charset="0"/>
@@ -7582,13 +7369,19 @@
                   <a:noFill/>
                 </a:ln>
                 <a:solidFill>
-                  <a:schemeClr val="tx1"/>
+                  <a:schemeClr val="bg1"/>
                 </a:solidFill>
                 <a:effectLst/>
                 <a:latin typeface="Times New Roman" panose="02020603050405020304" pitchFamily="18" charset="0"/>
                 <a:ea typeface="Calibri" panose="020F0502020204030204" pitchFamily="34" charset="0"/>
                 <a:cs typeface="Times New Roman" panose="02020603050405020304" pitchFamily="18" charset="0"/>
-                <a:hlinkClick r:id="rId3" action="ppaction://hlinksldjump"/>
+                <a:hlinkClick r:id="rId3" action="ppaction://hlinksldjump">
+                  <a:extLst>
+                    <a:ext uri="{A12FA001-AC4F-418D-AE19-62706E023703}">
+                      <ahyp:hlinkClr xmlns:ahyp="http://schemas.microsoft.com/office/drawing/2018/hyperlinkcolor" val="tx"/>
+                    </a:ext>
+                  </a:extLst>
+                </a:hlinkClick>
               </a:rPr>
               <a:t>Project Deliverables</a:t>
             </a:r>
@@ -7597,7 +7390,7 @@
                 <a:noFill/>
               </a:ln>
               <a:solidFill>
-                <a:schemeClr val="tx1"/>
+                <a:schemeClr val="bg1"/>
               </a:solidFill>
               <a:effectLst/>
               <a:latin typeface="Times New Roman" panose="02020603050405020304" pitchFamily="18" charset="0"/>
@@ -7634,13 +7427,19 @@
                   <a:noFill/>
                 </a:ln>
                 <a:solidFill>
-                  <a:schemeClr val="tx1"/>
+                  <a:schemeClr val="bg1"/>
                 </a:solidFill>
                 <a:effectLst/>
                 <a:latin typeface="Times New Roman" panose="02020603050405020304" pitchFamily="18" charset="0"/>
                 <a:ea typeface="Calibri" panose="020F0502020204030204" pitchFamily="34" charset="0"/>
                 <a:cs typeface="Times New Roman" panose="02020603050405020304" pitchFamily="18" charset="0"/>
-                <a:hlinkClick r:id="rId4" action="ppaction://hlinksldjump"/>
+                <a:hlinkClick r:id="rId4" action="ppaction://hlinksldjump">
+                  <a:extLst>
+                    <a:ext uri="{A12FA001-AC4F-418D-AE19-62706E023703}">
+                      <ahyp:hlinkClr xmlns:ahyp="http://schemas.microsoft.com/office/drawing/2018/hyperlinkcolor" val="tx"/>
+                    </a:ext>
+                  </a:extLst>
+                </a:hlinkClick>
               </a:rPr>
               <a:t>Artefact</a:t>
             </a:r>
@@ -7649,7 +7448,7 @@
                 <a:noFill/>
               </a:ln>
               <a:solidFill>
-                <a:schemeClr val="tx1"/>
+                <a:schemeClr val="bg1"/>
               </a:solidFill>
               <a:effectLst/>
               <a:latin typeface="Times New Roman" panose="02020603050405020304" pitchFamily="18" charset="0"/>
@@ -7673,13 +7472,19 @@
                   <a:noFill/>
                 </a:ln>
                 <a:solidFill>
-                  <a:schemeClr val="tx1"/>
+                  <a:schemeClr val="bg1"/>
                 </a:solidFill>
                 <a:effectLst/>
                 <a:latin typeface="Times New Roman" panose="02020603050405020304" pitchFamily="18" charset="0"/>
                 <a:ea typeface="Calibri" panose="020F0502020204030204" pitchFamily="34" charset="0"/>
                 <a:cs typeface="Times New Roman" panose="02020603050405020304" pitchFamily="18" charset="0"/>
-                <a:hlinkClick r:id="rId5"/>
+                <a:hlinkClick r:id="rId5">
+                  <a:extLst>
+                    <a:ext uri="{A12FA001-AC4F-418D-AE19-62706E023703}">
+                      <ahyp:hlinkClr xmlns:ahyp="http://schemas.microsoft.com/office/drawing/2018/hyperlinkcolor" val="tx"/>
+                    </a:ext>
+                  </a:extLst>
+                </a:hlinkClick>
               </a:rPr>
               <a:t>Project Context</a:t>
             </a:r>
@@ -7688,7 +7493,7 @@
                 <a:noFill/>
               </a:ln>
               <a:solidFill>
-                <a:schemeClr val="tx1"/>
+                <a:schemeClr val="bg1"/>
               </a:solidFill>
               <a:effectLst/>
               <a:latin typeface="Times New Roman" panose="02020603050405020304" pitchFamily="18" charset="0"/>
@@ -7712,13 +7517,19 @@
                   <a:noFill/>
                 </a:ln>
                 <a:solidFill>
-                  <a:schemeClr val="tx1"/>
+                  <a:schemeClr val="bg1"/>
                 </a:solidFill>
                 <a:effectLst/>
                 <a:latin typeface="Times New Roman" panose="02020603050405020304" pitchFamily="18" charset="0"/>
                 <a:ea typeface="Calibri" panose="020F0502020204030204" pitchFamily="34" charset="0"/>
                 <a:cs typeface="Times New Roman" panose="02020603050405020304" pitchFamily="18" charset="0"/>
-                <a:hlinkClick r:id="rId6"/>
+                <a:hlinkClick r:id="rId6">
+                  <a:extLst>
+                    <a:ext uri="{A12FA001-AC4F-418D-AE19-62706E023703}">
+                      <ahyp:hlinkClr xmlns:ahyp="http://schemas.microsoft.com/office/drawing/2018/hyperlinkcolor" val="tx"/>
+                    </a:ext>
+                  </a:extLst>
+                </a:hlinkClick>
               </a:rPr>
               <a:t>Aim &amp; Objectives</a:t>
             </a:r>
@@ -7727,7 +7538,7 @@
                 <a:noFill/>
               </a:ln>
               <a:solidFill>
-                <a:schemeClr val="tx1"/>
+                <a:schemeClr val="bg1"/>
               </a:solidFill>
               <a:effectLst/>
               <a:latin typeface="Times New Roman" panose="02020603050405020304" pitchFamily="18" charset="0"/>
@@ -7751,13 +7562,19 @@
                   <a:noFill/>
                 </a:ln>
                 <a:solidFill>
-                  <a:schemeClr val="tx1"/>
+                  <a:schemeClr val="bg1"/>
                 </a:solidFill>
                 <a:effectLst/>
                 <a:latin typeface="Times New Roman" panose="02020603050405020304" pitchFamily="18" charset="0"/>
                 <a:ea typeface="Calibri" panose="020F0502020204030204" pitchFamily="34" charset="0"/>
                 <a:cs typeface="Times New Roman" panose="02020603050405020304" pitchFamily="18" charset="0"/>
-                <a:hlinkClick r:id="rId7"/>
+                <a:hlinkClick r:id="rId7">
+                  <a:extLst>
+                    <a:ext uri="{A12FA001-AC4F-418D-AE19-62706E023703}">
+                      <ahyp:hlinkClr xmlns:ahyp="http://schemas.microsoft.com/office/drawing/2018/hyperlinkcolor" val="tx"/>
+                    </a:ext>
+                  </a:extLst>
+                </a:hlinkClick>
               </a:rPr>
               <a:t>Main Feature List</a:t>
             </a:r>
@@ -7766,7 +7583,7 @@
                 <a:noFill/>
               </a:ln>
               <a:solidFill>
-                <a:schemeClr val="tx1"/>
+                <a:schemeClr val="bg1"/>
               </a:solidFill>
               <a:effectLst/>
               <a:latin typeface="Times New Roman" panose="02020603050405020304" pitchFamily="18" charset="0"/>
@@ -7790,13 +7607,19 @@
                   <a:noFill/>
                 </a:ln>
                 <a:solidFill>
-                  <a:schemeClr val="tx1"/>
+                  <a:schemeClr val="bg1"/>
                 </a:solidFill>
                 <a:effectLst/>
                 <a:latin typeface="Times New Roman" panose="02020603050405020304" pitchFamily="18" charset="0"/>
                 <a:ea typeface="Calibri" panose="020F0502020204030204" pitchFamily="34" charset="0"/>
                 <a:cs typeface="Times New Roman" panose="02020603050405020304" pitchFamily="18" charset="0"/>
-                <a:hlinkClick r:id="rId8"/>
+                <a:hlinkClick r:id="rId8">
+                  <a:extLst>
+                    <a:ext uri="{A12FA001-AC4F-418D-AE19-62706E023703}">
+                      <ahyp:hlinkClr xmlns:ahyp="http://schemas.microsoft.com/office/drawing/2018/hyperlinkcolor" val="tx"/>
+                    </a:ext>
+                  </a:extLst>
+                </a:hlinkClick>
               </a:rPr>
               <a:t>Added Value</a:t>
             </a:r>
@@ -7805,7 +7628,7 @@
                 <a:noFill/>
               </a:ln>
               <a:solidFill>
-                <a:schemeClr val="tx1"/>
+                <a:schemeClr val="bg1"/>
               </a:solidFill>
               <a:effectLst/>
               <a:latin typeface="Times New Roman" panose="02020603050405020304" pitchFamily="18" charset="0"/>
@@ -7842,13 +7665,19 @@
                   <a:noFill/>
                 </a:ln>
                 <a:solidFill>
-                  <a:schemeClr val="tx1"/>
+                  <a:schemeClr val="bg1"/>
                 </a:solidFill>
                 <a:effectLst/>
                 <a:latin typeface="Times New Roman" panose="02020603050405020304" pitchFamily="18" charset="0"/>
                 <a:ea typeface="Calibri" panose="020F0502020204030204" pitchFamily="34" charset="0"/>
                 <a:cs typeface="Times New Roman" panose="02020603050405020304" pitchFamily="18" charset="0"/>
-                <a:hlinkClick r:id="rId9" action="ppaction://hlinksldjump"/>
+                <a:hlinkClick r:id="rId9" action="ppaction://hlinksldjump">
+                  <a:extLst>
+                    <a:ext uri="{A12FA001-AC4F-418D-AE19-62706E023703}">
+                      <ahyp:hlinkClr xmlns:ahyp="http://schemas.microsoft.com/office/drawing/2018/hyperlinkcolor" val="tx"/>
+                    </a:ext>
+                  </a:extLst>
+                </a:hlinkClick>
               </a:rPr>
               <a:t>Intellectual Challenges</a:t>
             </a:r>
@@ -7857,59 +7686,7 @@
                 <a:noFill/>
               </a:ln>
               <a:solidFill>
-                <a:schemeClr val="tx1"/>
-              </a:solidFill>
-              <a:effectLst/>
-              <a:latin typeface="Times New Roman" panose="02020603050405020304" pitchFamily="18" charset="0"/>
-              <a:cs typeface="Times New Roman" panose="02020603050405020304" pitchFamily="18" charset="0"/>
-            </a:endParaRPr>
-          </a:p>
-          <a:p>
-            <a:pPr marL="571500" marR="0" lvl="0" indent="-571500" algn="l" defTabSz="914400" rtl="0" eaLnBrk="0" fontAlgn="base" latinLnBrk="0" hangingPunct="0">
-              <a:lnSpc>
-                <a:spcPct val="100000"/>
-              </a:lnSpc>
-              <a:spcBef>
-                <a:spcPct val="0"/>
-              </a:spcBef>
-              <a:spcAft>
-                <a:spcPct val="0"/>
-              </a:spcAft>
-              <a:buClr>
-                <a:schemeClr val="bg1">
-                  <a:lumMod val="95000"/>
-                  <a:lumOff val="5000"/>
-                </a:schemeClr>
-              </a:buClr>
-              <a:buSzTx/>
-              <a:buFont typeface="Wingdings" panose="05000000000000000000" pitchFamily="2" charset="2"/>
-              <a:buChar char="Ø"/>
-              <a:tabLst>
-                <a:tab pos="5724525" algn="r"/>
-              </a:tabLst>
-            </a:pPr>
-            <a:r>
-              <a:rPr kumimoji="0" lang="en-US" altLang="en-US" sz="3600" b="0" i="0" strike="noStrike" cap="none" normalizeH="0" baseline="0" dirty="0">
-                <a:ln>
-                  <a:noFill/>
-                </a:ln>
-                <a:solidFill>
-                  <a:schemeClr val="tx1"/>
-                </a:solidFill>
-                <a:effectLst/>
-                <a:latin typeface="Times New Roman" panose="02020603050405020304" pitchFamily="18" charset="0"/>
-                <a:ea typeface="Calibri" panose="020F0502020204030204" pitchFamily="34" charset="0"/>
-                <a:cs typeface="Times New Roman" panose="02020603050405020304" pitchFamily="18" charset="0"/>
-                <a:hlinkClick r:id="rId10" action="ppaction://hlinksldjump"/>
-              </a:rPr>
-              <a:t>References</a:t>
-            </a:r>
-            <a:endParaRPr kumimoji="0" lang="en-US" altLang="en-US" sz="5400" b="0" i="0" strike="noStrike" cap="none" normalizeH="0" baseline="0" dirty="0">
-              <a:ln>
-                <a:noFill/>
-              </a:ln>
-              <a:solidFill>
-                <a:schemeClr val="tx1"/>
+                <a:schemeClr val="bg1"/>
               </a:solidFill>
               <a:effectLst/>
               <a:latin typeface="Times New Roman" panose="02020603050405020304" pitchFamily="18" charset="0"/>
@@ -8787,27 +8564,7 @@
                 <a:latin typeface="Times New Roman" panose="02020603050405020304" pitchFamily="18" charset="0"/>
                 <a:cs typeface="Times New Roman" panose="02020603050405020304" pitchFamily="18" charset="0"/>
               </a:rPr>
-              <a:t>Accounting will cover the customers, suppliers, [cash, </a:t>
-            </a:r>
-            <a:r>
-              <a:rPr lang="en-US" sz="2400" b="1" dirty="0" err="1">
-                <a:solidFill>
-                  <a:schemeClr val="bg1"/>
-                </a:solidFill>
-                <a:latin typeface="Times New Roman" panose="02020603050405020304" pitchFamily="18" charset="0"/>
-                <a:cs typeface="Times New Roman" panose="02020603050405020304" pitchFamily="18" charset="0"/>
-              </a:rPr>
-              <a:t>cheque</a:t>
-            </a:r>
-            <a:r>
-              <a:rPr lang="en-US" sz="2400" b="1" dirty="0">
-                <a:solidFill>
-                  <a:schemeClr val="bg1"/>
-                </a:solidFill>
-                <a:latin typeface="Times New Roman" panose="02020603050405020304" pitchFamily="18" charset="0"/>
-                <a:cs typeface="Times New Roman" panose="02020603050405020304" pitchFamily="18" charset="0"/>
-              </a:rPr>
-              <a:t> &amp; credit] transactions, bank and petty cash with loads of reports such as Stock Movement report, Reorder report, Inventory report, Cash flow report, Bank flow report, User detail / summery report, customer detail / summery report, supplier detail / summery report, Daily sales report, Sales range report and etc...</a:t>
+              <a:t>Accounting will cover the customers, suppliers, [cash, cheque &amp; credit] transactions, bank and petty cash with loads of reports such as Stock Movement report, Reorder report, Inventory report, Cash flow report, Bank flow report, User detail / summery report, customer detail / summery report, supplier detail / summery report, Daily sales report, Sales range report and etc...</a:t>
             </a:r>
           </a:p>
           <a:p>
@@ -8980,7 +8737,7 @@
           <a:lstStyle/>
           <a:p>
             <a:pPr algn="ctr"/>
-            <a:endParaRPr lang="en-US"/>
+            <a:endParaRPr lang="en-US" dirty="0"/>
           </a:p>
         </p:txBody>
       </p:sp>
@@ -9260,7 +9017,7 @@
           <a:lstStyle/>
           <a:p>
             <a:pPr algn="ctr"/>
-            <a:endParaRPr lang="en-US"/>
+            <a:endParaRPr lang="en-US" dirty="0"/>
           </a:p>
         </p:txBody>
       </p:sp>
@@ -9805,7 +9562,7 @@
           <a:lstStyle/>
           <a:p>
             <a:pPr algn="ctr"/>
-            <a:endParaRPr lang="en-US"/>
+            <a:endParaRPr lang="en-US" dirty="0"/>
           </a:p>
         </p:txBody>
       </p:sp>

</xml_diff>